<commit_message>
Udpate example for new assembly
</commit_message>
<xml_diff>
--- a/cloudera-framework-example/src/site/resources/Architecture.pptx
+++ b/cloudera-framework-example/src/site/resources/Architecture.pptx
@@ -200,7 +200,7 @@
           <a:p>
             <a:fld id="{C5389D1C-CB14-984D-9CE7-9AA778768F1D}" type="datetimeFigureOut">
               <a:rPr lang="en-US" smtClean="0"/>
-              <a:t>07/07/16</a:t>
+              <a:t>22/07/16</a:t>
             </a:fld>
             <a:endParaRPr lang="en-GB"/>
           </a:p>
@@ -33275,7 +33275,7 @@
                 <a:rPr lang="en-US" sz="1000" dirty="0" smtClean="0">
                   <a:cs typeface="Calibri Light"/>
                 </a:rPr>
-                <a:t>Processed</a:t>
+                <a:t>Cleansed</a:t>
               </a:r>
               <a:endParaRPr lang="en-US" sz="1000" dirty="0">
                 <a:solidFill>
@@ -33579,7 +33579,7 @@
                 <a:rPr lang="en-US" sz="1000" dirty="0" smtClean="0">
                   <a:cs typeface="Calibri Light"/>
                 </a:rPr>
-                <a:t>Processed</a:t>
+                <a:t>Cleansed</a:t>
               </a:r>
               <a:endParaRPr lang="en-US" sz="1000" dirty="0">
                 <a:solidFill>
@@ -34491,7 +34491,7 @@
                 <a:rPr lang="en-US" sz="1000" dirty="0" smtClean="0">
                   <a:cs typeface="Calibri Light"/>
                 </a:rPr>
-                <a:t>Processed</a:t>
+                <a:t>Cleansed</a:t>
               </a:r>
               <a:endParaRPr lang="en-US" sz="1000" dirty="0">
                 <a:solidFill>
@@ -34795,7 +34795,7 @@
                 <a:rPr lang="en-US" sz="1000" dirty="0" smtClean="0">
                   <a:cs typeface="Calibri Light"/>
                 </a:rPr>
-                <a:t>Processed</a:t>
+                <a:t>Cleansed</a:t>
               </a:r>
               <a:endParaRPr lang="en-US" sz="1000" dirty="0">
                 <a:solidFill>
@@ -36315,10 +36315,10 @@
             <a:p>
               <a:pPr algn="ctr"/>
               <a:r>
-                <a:rPr lang="en-US" sz="1000" dirty="0" smtClean="0">
+                <a:rPr lang="en-US" sz="1000" smtClean="0">
                   <a:cs typeface="Calibri Light"/>
                 </a:rPr>
-                <a:t>Process</a:t>
+                <a:t>Cleanse</a:t>
               </a:r>
               <a:endParaRPr lang="en-US" sz="1000" dirty="0">
                 <a:solidFill>
@@ -41479,7 +41479,7 @@
                 <a:rPr lang="en-US" sz="1000" dirty="0" smtClean="0">
                   <a:cs typeface="Calibri Light"/>
                 </a:rPr>
-                <a:t>Processed</a:t>
+                <a:t>Cleansed</a:t>
               </a:r>
               <a:endParaRPr lang="en-US" sz="1000" dirty="0">
                 <a:solidFill>
@@ -41783,7 +41783,7 @@
                 <a:rPr lang="en-US" sz="1000" dirty="0" smtClean="0">
                   <a:cs typeface="Calibri Light"/>
                 </a:rPr>
-                <a:t>Processed</a:t>
+                <a:t>Cleansed</a:t>
               </a:r>
               <a:endParaRPr lang="en-US" sz="1000" dirty="0">
                 <a:solidFill>
@@ -42695,7 +42695,7 @@
                 <a:rPr lang="en-US" sz="1000" dirty="0" smtClean="0">
                   <a:cs typeface="Calibri Light"/>
                 </a:rPr>
-                <a:t>Processed</a:t>
+                <a:t>Cleansed</a:t>
               </a:r>
               <a:endParaRPr lang="en-US" sz="1000" dirty="0">
                 <a:solidFill>
@@ -42999,7 +42999,7 @@
                 <a:rPr lang="en-US" sz="1000" dirty="0" smtClean="0">
                   <a:cs typeface="Calibri Light"/>
                 </a:rPr>
-                <a:t>Processed</a:t>
+                <a:t>Cleansed</a:t>
               </a:r>
               <a:endParaRPr lang="en-US" sz="1000" dirty="0">
                 <a:solidFill>
@@ -48274,8 +48274,19 @@
                 <a:latin typeface="Calibre Light"/>
                 <a:cs typeface="Calibre Light"/>
               </a:rPr>
-              <a:t>Data processing pipeline: raw, staged, partitioned, processed</a:t>
+              <a:t>Data processing pipeline: raw, staged, partitioned, </a:t>
             </a:r>
+            <a:r>
+              <a:rPr lang="en-GB" sz="2400" dirty="0" smtClean="0">
+                <a:latin typeface="Calibre Light"/>
+                <a:cs typeface="Calibre Light"/>
+              </a:rPr>
+              <a:t>Cleansed</a:t>
+            </a:r>
+            <a:endParaRPr lang="en-GB" sz="2400" dirty="0" smtClean="0">
+              <a:latin typeface="Calibre Light"/>
+              <a:cs typeface="Calibre Light"/>
+            </a:endParaRPr>
           </a:p>
           <a:p>
             <a:r>

</xml_diff>